<commit_message>
improved spacing, new arrow images
</commit_message>
<xml_diff>
--- a/shapes.pptx
+++ b/shapes.pptx
@@ -104,6 +104,11 @@
       </a:defRPr>
     </a:lvl9pPr>
   </p:defaultTextStyle>
+  <p:extLst>
+    <p:ext uri="{EFAFB233-063F-42B5-8137-9DF3F51BA10A}">
+      <p15:sldGuideLst xmlns:p15="http://schemas.microsoft.com/office/powerpoint/2012/main"/>
+    </p:ext>
+  </p:extLst>
 </p:presentation>
 </file>
 
@@ -238,7 +243,7 @@
           <a:p>
             <a:fld id="{AF0BADE7-7D10-43A0-84D9-41009E6864C8}" type="datetimeFigureOut">
               <a:rPr lang="en-US" smtClean="0"/>
-              <a:t>9/25/2018</a:t>
+              <a:t>10/3/2018</a:t>
             </a:fld>
             <a:endParaRPr lang="en-US"/>
           </a:p>
@@ -408,7 +413,7 @@
           <a:p>
             <a:fld id="{AF0BADE7-7D10-43A0-84D9-41009E6864C8}" type="datetimeFigureOut">
               <a:rPr lang="en-US" smtClean="0"/>
-              <a:t>9/25/2018</a:t>
+              <a:t>10/3/2018</a:t>
             </a:fld>
             <a:endParaRPr lang="en-US"/>
           </a:p>
@@ -588,7 +593,7 @@
           <a:p>
             <a:fld id="{AF0BADE7-7D10-43A0-84D9-41009E6864C8}" type="datetimeFigureOut">
               <a:rPr lang="en-US" smtClean="0"/>
-              <a:t>9/25/2018</a:t>
+              <a:t>10/3/2018</a:t>
             </a:fld>
             <a:endParaRPr lang="en-US"/>
           </a:p>
@@ -758,7 +763,7 @@
           <a:p>
             <a:fld id="{AF0BADE7-7D10-43A0-84D9-41009E6864C8}" type="datetimeFigureOut">
               <a:rPr lang="en-US" smtClean="0"/>
-              <a:t>9/25/2018</a:t>
+              <a:t>10/3/2018</a:t>
             </a:fld>
             <a:endParaRPr lang="en-US"/>
           </a:p>
@@ -1004,7 +1009,7 @@
           <a:p>
             <a:fld id="{AF0BADE7-7D10-43A0-84D9-41009E6864C8}" type="datetimeFigureOut">
               <a:rPr lang="en-US" smtClean="0"/>
-              <a:t>9/25/2018</a:t>
+              <a:t>10/3/2018</a:t>
             </a:fld>
             <a:endParaRPr lang="en-US"/>
           </a:p>
@@ -1236,7 +1241,7 @@
           <a:p>
             <a:fld id="{AF0BADE7-7D10-43A0-84D9-41009E6864C8}" type="datetimeFigureOut">
               <a:rPr lang="en-US" smtClean="0"/>
-              <a:t>9/25/2018</a:t>
+              <a:t>10/3/2018</a:t>
             </a:fld>
             <a:endParaRPr lang="en-US"/>
           </a:p>
@@ -1603,7 +1608,7 @@
           <a:p>
             <a:fld id="{AF0BADE7-7D10-43A0-84D9-41009E6864C8}" type="datetimeFigureOut">
               <a:rPr lang="en-US" smtClean="0"/>
-              <a:t>9/25/2018</a:t>
+              <a:t>10/3/2018</a:t>
             </a:fld>
             <a:endParaRPr lang="en-US"/>
           </a:p>
@@ -1721,7 +1726,7 @@
           <a:p>
             <a:fld id="{AF0BADE7-7D10-43A0-84D9-41009E6864C8}" type="datetimeFigureOut">
               <a:rPr lang="en-US" smtClean="0"/>
-              <a:t>9/25/2018</a:t>
+              <a:t>10/3/2018</a:t>
             </a:fld>
             <a:endParaRPr lang="en-US"/>
           </a:p>
@@ -1816,7 +1821,7 @@
           <a:p>
             <a:fld id="{AF0BADE7-7D10-43A0-84D9-41009E6864C8}" type="datetimeFigureOut">
               <a:rPr lang="en-US" smtClean="0"/>
-              <a:t>9/25/2018</a:t>
+              <a:t>10/3/2018</a:t>
             </a:fld>
             <a:endParaRPr lang="en-US"/>
           </a:p>
@@ -2093,7 +2098,7 @@
           <a:p>
             <a:fld id="{AF0BADE7-7D10-43A0-84D9-41009E6864C8}" type="datetimeFigureOut">
               <a:rPr lang="en-US" smtClean="0"/>
-              <a:t>9/25/2018</a:t>
+              <a:t>10/3/2018</a:t>
             </a:fld>
             <a:endParaRPr lang="en-US"/>
           </a:p>
@@ -2346,7 +2351,7 @@
           <a:p>
             <a:fld id="{AF0BADE7-7D10-43A0-84D9-41009E6864C8}" type="datetimeFigureOut">
               <a:rPr lang="en-US" smtClean="0"/>
-              <a:t>9/25/2018</a:t>
+              <a:t>10/3/2018</a:t>
             </a:fld>
             <a:endParaRPr lang="en-US"/>
           </a:p>
@@ -2559,7 +2564,7 @@
           <a:p>
             <a:fld id="{AF0BADE7-7D10-43A0-84D9-41009E6864C8}" type="datetimeFigureOut">
               <a:rPr lang="en-US" smtClean="0"/>
-              <a:t>9/25/2018</a:t>
+              <a:t>10/3/2018</a:t>
             </a:fld>
             <a:endParaRPr lang="en-US"/>
           </a:p>
@@ -3106,6 +3111,75 @@
           </a:p>
         </p:txBody>
       </p:sp>
+      <p:sp>
+        <p:nvSpPr>
+          <p:cNvPr id="3" name="Right Arrow 2"/>
+          <p:cNvSpPr/>
+          <p:nvPr/>
+        </p:nvSpPr>
+        <p:spPr>
+          <a:xfrm rot="16200000">
+            <a:off x="1394115" y="3574154"/>
+            <a:ext cx="152324" cy="147917"/>
+          </a:xfrm>
+          <a:prstGeom prst="rightArrow">
+            <a:avLst/>
+          </a:prstGeom>
+          <a:ln>
+            <a:solidFill>
+              <a:schemeClr val="tx1"/>
+            </a:solidFill>
+          </a:ln>
+        </p:spPr>
+        <p:style>
+          <a:lnRef idx="2">
+            <a:schemeClr val="accent1">
+              <a:shade val="50000"/>
+            </a:schemeClr>
+          </a:lnRef>
+          <a:fillRef idx="1">
+            <a:schemeClr val="accent1"/>
+          </a:fillRef>
+          <a:effectRef idx="0">
+            <a:schemeClr val="accent1"/>
+          </a:effectRef>
+          <a:fontRef idx="minor">
+            <a:schemeClr val="lt1"/>
+          </a:fontRef>
+        </p:style>
+        <p:txBody>
+          <a:bodyPr rtlCol="0" anchor="ctr"/>
+          <a:lstStyle/>
+          <a:p>
+            <a:pPr algn="ctr"/>
+            <a:endParaRPr lang="en-US"/>
+          </a:p>
+        </p:txBody>
+      </p:sp>
+      <p:pic>
+        <p:nvPicPr>
+          <p:cNvPr id="4" name="Picture 3"/>
+          <p:cNvPicPr>
+            <a:picLocks noChangeAspect="1"/>
+          </p:cNvPicPr>
+          <p:nvPr/>
+        </p:nvPicPr>
+        <p:blipFill>
+          <a:blip r:embed="rId2"/>
+          <a:stretch>
+            <a:fillRect/>
+          </a:stretch>
+        </p:blipFill>
+        <p:spPr>
+          <a:xfrm>
+            <a:off x="6731000" y="3302578"/>
+            <a:ext cx="762000" cy="962025"/>
+          </a:xfrm>
+          <a:prstGeom prst="rect">
+            <a:avLst/>
+          </a:prstGeom>
+        </p:spPr>
+      </p:pic>
     </p:spTree>
     <p:extLst>
       <p:ext uri="{BB962C8B-B14F-4D97-AF65-F5344CB8AC3E}">

</xml_diff>